<commit_message>
Add movie datils and update diagram
</commit_message>
<xml_diff>
--- a/extra/Sitemap.pptx
+++ b/extra/Sitemap.pptx
@@ -261,7 +261,7 @@
           <a:p>
             <a:fld id="{2326C657-C1E0-4964-BB1E-A691970DFC48}" type="datetimeFigureOut">
               <a:rPr lang="en-AU" smtClean="0"/>
-              <a:t>7/09/2018</a:t>
+              <a:t>10/09/2018</a:t>
             </a:fld>
             <a:endParaRPr lang="en-AU"/>
           </a:p>
@@ -461,7 +461,7 @@
           <a:p>
             <a:fld id="{2326C657-C1E0-4964-BB1E-A691970DFC48}" type="datetimeFigureOut">
               <a:rPr lang="en-AU" smtClean="0"/>
-              <a:t>7/09/2018</a:t>
+              <a:t>10/09/2018</a:t>
             </a:fld>
             <a:endParaRPr lang="en-AU"/>
           </a:p>
@@ -671,7 +671,7 @@
           <a:p>
             <a:fld id="{2326C657-C1E0-4964-BB1E-A691970DFC48}" type="datetimeFigureOut">
               <a:rPr lang="en-AU" smtClean="0"/>
-              <a:t>7/09/2018</a:t>
+              <a:t>10/09/2018</a:t>
             </a:fld>
             <a:endParaRPr lang="en-AU"/>
           </a:p>
@@ -871,7 +871,7 @@
           <a:p>
             <a:fld id="{2326C657-C1E0-4964-BB1E-A691970DFC48}" type="datetimeFigureOut">
               <a:rPr lang="en-AU" smtClean="0"/>
-              <a:t>7/09/2018</a:t>
+              <a:t>10/09/2018</a:t>
             </a:fld>
             <a:endParaRPr lang="en-AU"/>
           </a:p>
@@ -1147,7 +1147,7 @@
           <a:p>
             <a:fld id="{2326C657-C1E0-4964-BB1E-A691970DFC48}" type="datetimeFigureOut">
               <a:rPr lang="en-AU" smtClean="0"/>
-              <a:t>7/09/2018</a:t>
+              <a:t>10/09/2018</a:t>
             </a:fld>
             <a:endParaRPr lang="en-AU"/>
           </a:p>
@@ -1415,7 +1415,7 @@
           <a:p>
             <a:fld id="{2326C657-C1E0-4964-BB1E-A691970DFC48}" type="datetimeFigureOut">
               <a:rPr lang="en-AU" smtClean="0"/>
-              <a:t>7/09/2018</a:t>
+              <a:t>10/09/2018</a:t>
             </a:fld>
             <a:endParaRPr lang="en-AU"/>
           </a:p>
@@ -1830,7 +1830,7 @@
           <a:p>
             <a:fld id="{2326C657-C1E0-4964-BB1E-A691970DFC48}" type="datetimeFigureOut">
               <a:rPr lang="en-AU" smtClean="0"/>
-              <a:t>7/09/2018</a:t>
+              <a:t>10/09/2018</a:t>
             </a:fld>
             <a:endParaRPr lang="en-AU"/>
           </a:p>
@@ -1972,7 +1972,7 @@
           <a:p>
             <a:fld id="{2326C657-C1E0-4964-BB1E-A691970DFC48}" type="datetimeFigureOut">
               <a:rPr lang="en-AU" smtClean="0"/>
-              <a:t>7/09/2018</a:t>
+              <a:t>10/09/2018</a:t>
             </a:fld>
             <a:endParaRPr lang="en-AU"/>
           </a:p>
@@ -2085,7 +2085,7 @@
           <a:p>
             <a:fld id="{2326C657-C1E0-4964-BB1E-A691970DFC48}" type="datetimeFigureOut">
               <a:rPr lang="en-AU" smtClean="0"/>
-              <a:t>7/09/2018</a:t>
+              <a:t>10/09/2018</a:t>
             </a:fld>
             <a:endParaRPr lang="en-AU"/>
           </a:p>
@@ -2398,7 +2398,7 @@
           <a:p>
             <a:fld id="{2326C657-C1E0-4964-BB1E-A691970DFC48}" type="datetimeFigureOut">
               <a:rPr lang="en-AU" smtClean="0"/>
-              <a:t>7/09/2018</a:t>
+              <a:t>10/09/2018</a:t>
             </a:fld>
             <a:endParaRPr lang="en-AU"/>
           </a:p>
@@ -2687,7 +2687,7 @@
           <a:p>
             <a:fld id="{2326C657-C1E0-4964-BB1E-A691970DFC48}" type="datetimeFigureOut">
               <a:rPr lang="en-AU" smtClean="0"/>
-              <a:t>7/09/2018</a:t>
+              <a:t>10/09/2018</a:t>
             </a:fld>
             <a:endParaRPr lang="en-AU"/>
           </a:p>
@@ -2930,7 +2930,7 @@
           <a:p>
             <a:fld id="{2326C657-C1E0-4964-BB1E-A691970DFC48}" type="datetimeFigureOut">
               <a:rPr lang="en-AU" smtClean="0"/>
-              <a:t>7/09/2018</a:t>
+              <a:t>10/09/2018</a:t>
             </a:fld>
             <a:endParaRPr lang="en-AU"/>
           </a:p>
@@ -3349,10 +3349,10 @@
       </p:grpSpPr>
       <p:sp>
         <p:nvSpPr>
-          <p:cNvPr id="29" name="Rectangle 28">
-            <a:extLst>
-              <a:ext uri="{FF2B5EF4-FFF2-40B4-BE49-F238E27FC236}">
-                <a16:creationId xmlns:a16="http://schemas.microsoft.com/office/drawing/2014/main" id="{8B96EFFF-1DD0-4016-9A07-1C195C2166DD}"/>
+          <p:cNvPr id="25" name="Rectangle 24">
+            <a:extLst>
+              <a:ext uri="{FF2B5EF4-FFF2-40B4-BE49-F238E27FC236}">
+                <a16:creationId xmlns:a16="http://schemas.microsoft.com/office/drawing/2014/main" id="{66A3DD35-1F03-4158-B368-268377F3C856}"/>
               </a:ext>
             </a:extLst>
           </p:cNvPr>
@@ -3361,8 +3361,309 @@
         </p:nvSpPr>
         <p:spPr>
           <a:xfrm>
-            <a:off x="-1607528" y="11307868"/>
-            <a:ext cx="13009482" cy="6086474"/>
+            <a:off x="-67694" y="7421880"/>
+            <a:ext cx="5910773" cy="3101073"/>
+          </a:xfrm>
+          <a:prstGeom prst="rect">
+            <a:avLst/>
+          </a:prstGeom>
+        </p:spPr>
+        <p:style>
+          <a:lnRef idx="2">
+            <a:schemeClr val="accent6">
+              <a:shade val="50000"/>
+            </a:schemeClr>
+          </a:lnRef>
+          <a:fillRef idx="1">
+            <a:schemeClr val="accent6"/>
+          </a:fillRef>
+          <a:effectRef idx="0">
+            <a:schemeClr val="accent6"/>
+          </a:effectRef>
+          <a:fontRef idx="minor">
+            <a:schemeClr val="lt1"/>
+          </a:fontRef>
+        </p:style>
+        <p:txBody>
+          <a:bodyPr rtlCol="0" anchor="ctr"/>
+          <a:lstStyle/>
+          <a:p>
+            <a:pPr algn="ctr"/>
+            <a:r>
+              <a:rPr lang="en-AU" dirty="0"/>
+              <a:t>Functions</a:t>
+            </a:r>
+          </a:p>
+        </p:txBody>
+      </p:sp>
+      <p:sp>
+        <p:nvSpPr>
+          <p:cNvPr id="24" name="Rectangle 23">
+            <a:extLst>
+              <a:ext uri="{FF2B5EF4-FFF2-40B4-BE49-F238E27FC236}">
+                <a16:creationId xmlns:a16="http://schemas.microsoft.com/office/drawing/2014/main" id="{E72A40E1-0A67-4661-B694-5E5E83561B00}"/>
+              </a:ext>
+            </a:extLst>
+          </p:cNvPr>
+          <p:cNvSpPr/>
+          <p:nvPr/>
+        </p:nvSpPr>
+        <p:spPr>
+          <a:xfrm>
+            <a:off x="8765026" y="4226379"/>
+            <a:ext cx="3426974" cy="2631621"/>
+          </a:xfrm>
+          <a:prstGeom prst="rect">
+            <a:avLst/>
+          </a:prstGeom>
+        </p:spPr>
+        <p:style>
+          <a:lnRef idx="2">
+            <a:schemeClr val="accent6">
+              <a:shade val="50000"/>
+            </a:schemeClr>
+          </a:lnRef>
+          <a:fillRef idx="1">
+            <a:schemeClr val="accent6"/>
+          </a:fillRef>
+          <a:effectRef idx="0">
+            <a:schemeClr val="accent6"/>
+          </a:effectRef>
+          <a:fontRef idx="minor">
+            <a:schemeClr val="lt1"/>
+          </a:fontRef>
+        </p:style>
+        <p:txBody>
+          <a:bodyPr rtlCol="0" anchor="ctr"/>
+          <a:lstStyle/>
+          <a:p>
+            <a:pPr algn="ctr"/>
+            <a:r>
+              <a:rPr lang="en-AU" dirty="0"/>
+              <a:t>Functions</a:t>
+            </a:r>
+          </a:p>
+        </p:txBody>
+      </p:sp>
+      <p:sp>
+        <p:nvSpPr>
+          <p:cNvPr id="32" name="Rectangle 31">
+            <a:extLst>
+              <a:ext uri="{FF2B5EF4-FFF2-40B4-BE49-F238E27FC236}">
+                <a16:creationId xmlns:a16="http://schemas.microsoft.com/office/drawing/2014/main" id="{F8123D76-B47E-46AB-B1A8-3EC9F426D037}"/>
+              </a:ext>
+            </a:extLst>
+          </p:cNvPr>
+          <p:cNvSpPr/>
+          <p:nvPr/>
+        </p:nvSpPr>
+        <p:spPr>
+          <a:xfrm>
+            <a:off x="11500" y="2847309"/>
+            <a:ext cx="5706836" cy="4567314"/>
+          </a:xfrm>
+          <a:prstGeom prst="rect">
+            <a:avLst/>
+          </a:prstGeom>
+        </p:spPr>
+        <p:style>
+          <a:lnRef idx="2">
+            <a:schemeClr val="dk1">
+              <a:shade val="50000"/>
+            </a:schemeClr>
+          </a:lnRef>
+          <a:fillRef idx="1">
+            <a:schemeClr val="dk1"/>
+          </a:fillRef>
+          <a:effectRef idx="0">
+            <a:schemeClr val="dk1"/>
+          </a:effectRef>
+          <a:fontRef idx="minor">
+            <a:schemeClr val="lt1"/>
+          </a:fontRef>
+        </p:style>
+        <p:txBody>
+          <a:bodyPr rtlCol="0" anchor="ctr"/>
+          <a:lstStyle/>
+          <a:p>
+            <a:pPr algn="ctr"/>
+            <a:r>
+              <a:rPr lang="en-AU" dirty="0"/>
+              <a:t>Public area</a:t>
+            </a:r>
+          </a:p>
+        </p:txBody>
+      </p:sp>
+      <p:sp>
+        <p:nvSpPr>
+          <p:cNvPr id="31" name="Rectangle 30">
+            <a:extLst>
+              <a:ext uri="{FF2B5EF4-FFF2-40B4-BE49-F238E27FC236}">
+                <a16:creationId xmlns:a16="http://schemas.microsoft.com/office/drawing/2014/main" id="{E64F4874-F646-40AD-936D-61F248DB02BA}"/>
+              </a:ext>
+            </a:extLst>
+          </p:cNvPr>
+          <p:cNvSpPr/>
+          <p:nvPr/>
+        </p:nvSpPr>
+        <p:spPr>
+          <a:xfrm>
+            <a:off x="-219" y="0"/>
+            <a:ext cx="4056502" cy="2658836"/>
+          </a:xfrm>
+          <a:prstGeom prst="rect">
+            <a:avLst/>
+          </a:prstGeom>
+          <a:solidFill>
+            <a:schemeClr val="accent1">
+              <a:lumMod val="40000"/>
+              <a:lumOff val="60000"/>
+            </a:schemeClr>
+          </a:solidFill>
+        </p:spPr>
+        <p:style>
+          <a:lnRef idx="2">
+            <a:schemeClr val="accent3">
+              <a:shade val="50000"/>
+            </a:schemeClr>
+          </a:lnRef>
+          <a:fillRef idx="1">
+            <a:schemeClr val="accent3"/>
+          </a:fillRef>
+          <a:effectRef idx="0">
+            <a:schemeClr val="accent3"/>
+          </a:effectRef>
+          <a:fontRef idx="minor">
+            <a:schemeClr val="lt1"/>
+          </a:fontRef>
+        </p:style>
+        <p:txBody>
+          <a:bodyPr rtlCol="0" anchor="ctr"/>
+          <a:lstStyle/>
+          <a:p>
+            <a:pPr algn="ctr"/>
+            <a:r>
+              <a:rPr lang="en-AU" dirty="0"/>
+              <a:t>member area</a:t>
+            </a:r>
+          </a:p>
+        </p:txBody>
+      </p:sp>
+      <p:sp>
+        <p:nvSpPr>
+          <p:cNvPr id="20" name="Rectangle 19">
+            <a:extLst>
+              <a:ext uri="{FF2B5EF4-FFF2-40B4-BE49-F238E27FC236}">
+                <a16:creationId xmlns:a16="http://schemas.microsoft.com/office/drawing/2014/main" id="{05E49130-96F1-48C5-BE29-902270A8D427}"/>
+              </a:ext>
+            </a:extLst>
+          </p:cNvPr>
+          <p:cNvSpPr/>
+          <p:nvPr/>
+        </p:nvSpPr>
+        <p:spPr>
+          <a:xfrm>
+            <a:off x="0" y="-2409143"/>
+            <a:ext cx="12192000" cy="1877785"/>
+          </a:xfrm>
+          <a:prstGeom prst="rect">
+            <a:avLst/>
+          </a:prstGeom>
+        </p:spPr>
+        <p:style>
+          <a:lnRef idx="2">
+            <a:schemeClr val="accent6">
+              <a:shade val="50000"/>
+            </a:schemeClr>
+          </a:lnRef>
+          <a:fillRef idx="1">
+            <a:schemeClr val="accent6"/>
+          </a:fillRef>
+          <a:effectRef idx="0">
+            <a:schemeClr val="accent6"/>
+          </a:effectRef>
+          <a:fontRef idx="minor">
+            <a:schemeClr val="lt1"/>
+          </a:fontRef>
+        </p:style>
+        <p:txBody>
+          <a:bodyPr rtlCol="0" anchor="ctr"/>
+          <a:lstStyle/>
+          <a:p>
+            <a:pPr algn="ctr"/>
+            <a:r>
+              <a:rPr lang="en-AU" dirty="0"/>
+              <a:t>Functions</a:t>
+            </a:r>
+          </a:p>
+        </p:txBody>
+      </p:sp>
+      <p:sp>
+        <p:nvSpPr>
+          <p:cNvPr id="4" name="Rectangle 3">
+            <a:extLst>
+              <a:ext uri="{FF2B5EF4-FFF2-40B4-BE49-F238E27FC236}">
+                <a16:creationId xmlns:a16="http://schemas.microsoft.com/office/drawing/2014/main" id="{173E8AF5-86C9-4EAF-ADCD-24D8185C9E66}"/>
+              </a:ext>
+            </a:extLst>
+          </p:cNvPr>
+          <p:cNvSpPr/>
+          <p:nvPr/>
+        </p:nvSpPr>
+        <p:spPr>
+          <a:xfrm>
+            <a:off x="4761756" y="219083"/>
+            <a:ext cx="2677886" cy="1877785"/>
+          </a:xfrm>
+          <a:prstGeom prst="rect">
+            <a:avLst/>
+          </a:prstGeom>
+        </p:spPr>
+        <p:style>
+          <a:lnRef idx="2">
+            <a:schemeClr val="accent1">
+              <a:shade val="50000"/>
+            </a:schemeClr>
+          </a:lnRef>
+          <a:fillRef idx="1">
+            <a:schemeClr val="accent1"/>
+          </a:fillRef>
+          <a:effectRef idx="0">
+            <a:schemeClr val="accent1"/>
+          </a:effectRef>
+          <a:fontRef idx="minor">
+            <a:schemeClr val="lt1"/>
+          </a:fontRef>
+        </p:style>
+        <p:txBody>
+          <a:bodyPr rtlCol="0" anchor="ctr"/>
+          <a:lstStyle/>
+          <a:p>
+            <a:pPr algn="ctr"/>
+            <a:r>
+              <a:rPr lang="en-AU" dirty="0" err="1"/>
+              <a:t>index.php</a:t>
+            </a:r>
+            <a:endParaRPr lang="en-AU" dirty="0"/>
+          </a:p>
+        </p:txBody>
+      </p:sp>
+      <p:sp>
+        <p:nvSpPr>
+          <p:cNvPr id="5" name="Rectangle 4">
+            <a:extLst>
+              <a:ext uri="{FF2B5EF4-FFF2-40B4-BE49-F238E27FC236}">
+                <a16:creationId xmlns:a16="http://schemas.microsoft.com/office/drawing/2014/main" id="{C540DBA4-C5DA-439D-9662-49F335591C3C}"/>
+              </a:ext>
+            </a:extLst>
+          </p:cNvPr>
+          <p:cNvSpPr/>
+          <p:nvPr/>
+        </p:nvSpPr>
+        <p:spPr>
+          <a:xfrm>
+            <a:off x="8765027" y="0"/>
+            <a:ext cx="3426974" cy="4226379"/>
           </a:xfrm>
           <a:prstGeom prst="rect">
             <a:avLst/>
@@ -3391,17 +3692,17 @@
             <a:pPr algn="ctr"/>
             <a:r>
               <a:rPr lang="en-AU" dirty="0"/>
-              <a:t>Need to be added</a:t>
-            </a:r>
-          </a:p>
-        </p:txBody>
-      </p:sp>
-      <p:sp>
-        <p:nvSpPr>
-          <p:cNvPr id="25" name="Rectangle 24">
-            <a:extLst>
-              <a:ext uri="{FF2B5EF4-FFF2-40B4-BE49-F238E27FC236}">
-                <a16:creationId xmlns:a16="http://schemas.microsoft.com/office/drawing/2014/main" id="{66A3DD35-1F03-4158-B368-268377F3C856}"/>
+              <a:t>Admin area</a:t>
+            </a:r>
+          </a:p>
+        </p:txBody>
+      </p:sp>
+      <p:sp>
+        <p:nvSpPr>
+          <p:cNvPr id="6" name="Rectangle 5">
+            <a:extLst>
+              <a:ext uri="{FF2B5EF4-FFF2-40B4-BE49-F238E27FC236}">
+                <a16:creationId xmlns:a16="http://schemas.microsoft.com/office/drawing/2014/main" id="{9BE2BFC0-0852-431E-9DE3-9B0EB6E5BF0B}"/>
               </a:ext>
             </a:extLst>
           </p:cNvPr>
@@ -3410,357 +3711,7 @@
         </p:nvSpPr>
         <p:spPr>
           <a:xfrm>
-            <a:off x="-1545378" y="7887226"/>
-            <a:ext cx="5910773" cy="3101073"/>
-          </a:xfrm>
-          <a:prstGeom prst="rect">
-            <a:avLst/>
-          </a:prstGeom>
-        </p:spPr>
-        <p:style>
-          <a:lnRef idx="2">
-            <a:schemeClr val="accent6">
-              <a:shade val="50000"/>
-            </a:schemeClr>
-          </a:lnRef>
-          <a:fillRef idx="1">
-            <a:schemeClr val="accent6"/>
-          </a:fillRef>
-          <a:effectRef idx="0">
-            <a:schemeClr val="accent6"/>
-          </a:effectRef>
-          <a:fontRef idx="minor">
-            <a:schemeClr val="lt1"/>
-          </a:fontRef>
-        </p:style>
-        <p:txBody>
-          <a:bodyPr rtlCol="0" anchor="ctr"/>
-          <a:lstStyle/>
-          <a:p>
-            <a:pPr algn="ctr"/>
-            <a:r>
-              <a:rPr lang="en-AU" dirty="0"/>
-              <a:t>Functions</a:t>
-            </a:r>
-          </a:p>
-        </p:txBody>
-      </p:sp>
-      <p:sp>
-        <p:nvSpPr>
-          <p:cNvPr id="24" name="Rectangle 23">
-            <a:extLst>
-              <a:ext uri="{FF2B5EF4-FFF2-40B4-BE49-F238E27FC236}">
-                <a16:creationId xmlns:a16="http://schemas.microsoft.com/office/drawing/2014/main" id="{E72A40E1-0A67-4661-B694-5E5E83561B00}"/>
-              </a:ext>
-            </a:extLst>
-          </p:cNvPr>
-          <p:cNvSpPr/>
-          <p:nvPr/>
-        </p:nvSpPr>
-        <p:spPr>
-          <a:xfrm>
-            <a:off x="7195791" y="6808220"/>
-            <a:ext cx="4214434" cy="3549653"/>
-          </a:xfrm>
-          <a:prstGeom prst="rect">
-            <a:avLst/>
-          </a:prstGeom>
-        </p:spPr>
-        <p:style>
-          <a:lnRef idx="2">
-            <a:schemeClr val="accent6">
-              <a:shade val="50000"/>
-            </a:schemeClr>
-          </a:lnRef>
-          <a:fillRef idx="1">
-            <a:schemeClr val="accent6"/>
-          </a:fillRef>
-          <a:effectRef idx="0">
-            <a:schemeClr val="accent6"/>
-          </a:effectRef>
-          <a:fontRef idx="minor">
-            <a:schemeClr val="lt1"/>
-          </a:fontRef>
-        </p:style>
-        <p:txBody>
-          <a:bodyPr rtlCol="0" anchor="ctr"/>
-          <a:lstStyle/>
-          <a:p>
-            <a:pPr algn="ctr"/>
-            <a:r>
-              <a:rPr lang="en-AU" dirty="0"/>
-              <a:t>Functions</a:t>
-            </a:r>
-          </a:p>
-        </p:txBody>
-      </p:sp>
-      <p:sp>
-        <p:nvSpPr>
-          <p:cNvPr id="32" name="Rectangle 31">
-            <a:extLst>
-              <a:ext uri="{FF2B5EF4-FFF2-40B4-BE49-F238E27FC236}">
-                <a16:creationId xmlns:a16="http://schemas.microsoft.com/office/drawing/2014/main" id="{F8123D76-B47E-46AB-B1A8-3EC9F426D037}"/>
-              </a:ext>
-            </a:extLst>
-          </p:cNvPr>
-          <p:cNvSpPr/>
-          <p:nvPr/>
-        </p:nvSpPr>
-        <p:spPr>
-          <a:xfrm>
-            <a:off x="-1466184" y="3312655"/>
-            <a:ext cx="5706836" cy="4567314"/>
-          </a:xfrm>
-          <a:prstGeom prst="rect">
-            <a:avLst/>
-          </a:prstGeom>
-        </p:spPr>
-        <p:style>
-          <a:lnRef idx="2">
-            <a:schemeClr val="dk1">
-              <a:shade val="50000"/>
-            </a:schemeClr>
-          </a:lnRef>
-          <a:fillRef idx="1">
-            <a:schemeClr val="dk1"/>
-          </a:fillRef>
-          <a:effectRef idx="0">
-            <a:schemeClr val="dk1"/>
-          </a:effectRef>
-          <a:fontRef idx="minor">
-            <a:schemeClr val="lt1"/>
-          </a:fontRef>
-        </p:style>
-        <p:txBody>
-          <a:bodyPr rtlCol="0" anchor="ctr"/>
-          <a:lstStyle/>
-          <a:p>
-            <a:pPr algn="ctr"/>
-            <a:r>
-              <a:rPr lang="en-AU" dirty="0"/>
-              <a:t>Public area</a:t>
-            </a:r>
-          </a:p>
-        </p:txBody>
-      </p:sp>
-      <p:sp>
-        <p:nvSpPr>
-          <p:cNvPr id="31" name="Rectangle 30">
-            <a:extLst>
-              <a:ext uri="{FF2B5EF4-FFF2-40B4-BE49-F238E27FC236}">
-                <a16:creationId xmlns:a16="http://schemas.microsoft.com/office/drawing/2014/main" id="{E64F4874-F646-40AD-936D-61F248DB02BA}"/>
-              </a:ext>
-            </a:extLst>
-          </p:cNvPr>
-          <p:cNvSpPr/>
-          <p:nvPr/>
-        </p:nvSpPr>
-        <p:spPr>
-          <a:xfrm>
-            <a:off x="-1403591" y="51025"/>
-            <a:ext cx="5706836" cy="2658836"/>
-          </a:xfrm>
-          <a:prstGeom prst="rect">
-            <a:avLst/>
-          </a:prstGeom>
-          <a:solidFill>
-            <a:schemeClr val="accent1">
-              <a:lumMod val="40000"/>
-              <a:lumOff val="60000"/>
-            </a:schemeClr>
-          </a:solidFill>
-        </p:spPr>
-        <p:style>
-          <a:lnRef idx="2">
-            <a:schemeClr val="accent3">
-              <a:shade val="50000"/>
-            </a:schemeClr>
-          </a:lnRef>
-          <a:fillRef idx="1">
-            <a:schemeClr val="accent3"/>
-          </a:fillRef>
-          <a:effectRef idx="0">
-            <a:schemeClr val="accent3"/>
-          </a:effectRef>
-          <a:fontRef idx="minor">
-            <a:schemeClr val="lt1"/>
-          </a:fontRef>
-        </p:style>
-        <p:txBody>
-          <a:bodyPr rtlCol="0" anchor="ctr"/>
-          <a:lstStyle/>
-          <a:p>
-            <a:pPr algn="ctr"/>
-            <a:r>
-              <a:rPr lang="en-AU" dirty="0"/>
-              <a:t>member area</a:t>
-            </a:r>
-          </a:p>
-        </p:txBody>
-      </p:sp>
-      <p:sp>
-        <p:nvSpPr>
-          <p:cNvPr id="20" name="Rectangle 19">
-            <a:extLst>
-              <a:ext uri="{FF2B5EF4-FFF2-40B4-BE49-F238E27FC236}">
-                <a16:creationId xmlns:a16="http://schemas.microsoft.com/office/drawing/2014/main" id="{05E49130-96F1-48C5-BE29-902270A8D427}"/>
-              </a:ext>
-            </a:extLst>
-          </p:cNvPr>
-          <p:cNvSpPr/>
-          <p:nvPr/>
-        </p:nvSpPr>
-        <p:spPr>
-          <a:xfrm>
-            <a:off x="45070" y="-2409143"/>
-            <a:ext cx="11623557" cy="1877785"/>
-          </a:xfrm>
-          <a:prstGeom prst="rect">
-            <a:avLst/>
-          </a:prstGeom>
-        </p:spPr>
-        <p:style>
-          <a:lnRef idx="2">
-            <a:schemeClr val="accent6">
-              <a:shade val="50000"/>
-            </a:schemeClr>
-          </a:lnRef>
-          <a:fillRef idx="1">
-            <a:schemeClr val="accent6"/>
-          </a:fillRef>
-          <a:effectRef idx="0">
-            <a:schemeClr val="accent6"/>
-          </a:effectRef>
-          <a:fontRef idx="minor">
-            <a:schemeClr val="lt1"/>
-          </a:fontRef>
-        </p:style>
-        <p:txBody>
-          <a:bodyPr rtlCol="0" anchor="ctr"/>
-          <a:lstStyle/>
-          <a:p>
-            <a:pPr algn="ctr"/>
-            <a:r>
-              <a:rPr lang="en-AU" dirty="0"/>
-              <a:t>Functions</a:t>
-            </a:r>
-          </a:p>
-        </p:txBody>
-      </p:sp>
-      <p:sp>
-        <p:nvSpPr>
-          <p:cNvPr id="4" name="Rectangle 3">
-            <a:extLst>
-              <a:ext uri="{FF2B5EF4-FFF2-40B4-BE49-F238E27FC236}">
-                <a16:creationId xmlns:a16="http://schemas.microsoft.com/office/drawing/2014/main" id="{173E8AF5-86C9-4EAF-ADCD-24D8185C9E66}"/>
-              </a:ext>
-            </a:extLst>
-          </p:cNvPr>
-          <p:cNvSpPr/>
-          <p:nvPr/>
-        </p:nvSpPr>
-        <p:spPr>
-          <a:xfrm>
-            <a:off x="4517905" y="372834"/>
-            <a:ext cx="2677886" cy="1877785"/>
-          </a:xfrm>
-          <a:prstGeom prst="rect">
-            <a:avLst/>
-          </a:prstGeom>
-        </p:spPr>
-        <p:style>
-          <a:lnRef idx="2">
-            <a:schemeClr val="accent1">
-              <a:shade val="50000"/>
-            </a:schemeClr>
-          </a:lnRef>
-          <a:fillRef idx="1">
-            <a:schemeClr val="accent1"/>
-          </a:fillRef>
-          <a:effectRef idx="0">
-            <a:schemeClr val="accent1"/>
-          </a:effectRef>
-          <a:fontRef idx="minor">
-            <a:schemeClr val="lt1"/>
-          </a:fontRef>
-        </p:style>
-        <p:txBody>
-          <a:bodyPr rtlCol="0" anchor="ctr"/>
-          <a:lstStyle/>
-          <a:p>
-            <a:pPr algn="ctr"/>
-            <a:r>
-              <a:rPr lang="en-AU" dirty="0" err="1"/>
-              <a:t>index.php</a:t>
-            </a:r>
-            <a:endParaRPr lang="en-AU" dirty="0"/>
-          </a:p>
-        </p:txBody>
-      </p:sp>
-      <p:sp>
-        <p:nvSpPr>
-          <p:cNvPr id="5" name="Rectangle 4">
-            <a:extLst>
-              <a:ext uri="{FF2B5EF4-FFF2-40B4-BE49-F238E27FC236}">
-                <a16:creationId xmlns:a16="http://schemas.microsoft.com/office/drawing/2014/main" id="{C540DBA4-C5DA-439D-9662-49F335591C3C}"/>
-              </a:ext>
-            </a:extLst>
-          </p:cNvPr>
-          <p:cNvSpPr/>
-          <p:nvPr/>
-        </p:nvSpPr>
-        <p:spPr>
-          <a:xfrm>
-            <a:off x="7410451" y="385763"/>
-            <a:ext cx="3426974" cy="6086474"/>
-          </a:xfrm>
-          <a:prstGeom prst="rect">
-            <a:avLst/>
-          </a:prstGeom>
-        </p:spPr>
-        <p:style>
-          <a:lnRef idx="2">
-            <a:schemeClr val="accent4">
-              <a:shade val="50000"/>
-            </a:schemeClr>
-          </a:lnRef>
-          <a:fillRef idx="1">
-            <a:schemeClr val="accent4"/>
-          </a:fillRef>
-          <a:effectRef idx="0">
-            <a:schemeClr val="accent4"/>
-          </a:effectRef>
-          <a:fontRef idx="minor">
-            <a:schemeClr val="lt1"/>
-          </a:fontRef>
-        </p:style>
-        <p:txBody>
-          <a:bodyPr rtlCol="0" anchor="ctr"/>
-          <a:lstStyle/>
-          <a:p>
-            <a:pPr algn="ctr"/>
-            <a:r>
-              <a:rPr lang="en-AU" dirty="0"/>
-              <a:t>Admin area</a:t>
-            </a:r>
-          </a:p>
-        </p:txBody>
-      </p:sp>
-      <p:sp>
-        <p:nvSpPr>
-          <p:cNvPr id="6" name="Rectangle 5">
-            <a:extLst>
-              <a:ext uri="{FF2B5EF4-FFF2-40B4-BE49-F238E27FC236}">
-                <a16:creationId xmlns:a16="http://schemas.microsoft.com/office/drawing/2014/main" id="{9BE2BFC0-0852-431E-9DE3-9B0EB6E5BF0B}"/>
-              </a:ext>
-            </a:extLst>
-          </p:cNvPr>
-          <p:cNvSpPr/>
-          <p:nvPr/>
-        </p:nvSpPr>
-        <p:spPr>
-          <a:xfrm>
-            <a:off x="7511143" y="829352"/>
+            <a:off x="8865719" y="443589"/>
             <a:ext cx="2677886" cy="571502"/>
           </a:xfrm>
           <a:prstGeom prst="rect">
@@ -3815,7 +3766,7 @@
         </p:nvSpPr>
         <p:spPr>
           <a:xfrm>
-            <a:off x="7549243" y="4642073"/>
+            <a:off x="8903819" y="2927859"/>
             <a:ext cx="2677886" cy="571502"/>
           </a:xfrm>
           <a:prstGeom prst="rect">
@@ -3870,7 +3821,7 @@
         </p:nvSpPr>
         <p:spPr>
           <a:xfrm>
-            <a:off x="1410009" y="4905141"/>
+            <a:off x="2887693" y="4439795"/>
             <a:ext cx="2677886" cy="571502"/>
           </a:xfrm>
           <a:prstGeom prst="rect">
@@ -3918,7 +3869,7 @@
         </p:nvSpPr>
         <p:spPr>
           <a:xfrm>
-            <a:off x="7549243" y="5414959"/>
+            <a:off x="8903819" y="3533435"/>
             <a:ext cx="2677886" cy="571502"/>
           </a:xfrm>
           <a:prstGeom prst="rect">
@@ -3973,7 +3924,7 @@
         </p:nvSpPr>
         <p:spPr>
           <a:xfrm>
-            <a:off x="7549243" y="2709861"/>
+            <a:off x="8903819" y="2324098"/>
             <a:ext cx="2677886" cy="571502"/>
           </a:xfrm>
           <a:prstGeom prst="rect">
@@ -4028,7 +3979,7 @@
         </p:nvSpPr>
         <p:spPr>
           <a:xfrm>
-            <a:off x="8159539" y="7622036"/>
+            <a:off x="8939296" y="4489167"/>
             <a:ext cx="2677886" cy="571502"/>
           </a:xfrm>
           <a:prstGeom prst="rect">
@@ -4076,7 +4027,7 @@
         </p:nvSpPr>
         <p:spPr>
           <a:xfrm>
-            <a:off x="-1466184" y="3422192"/>
+            <a:off x="11500" y="2956846"/>
             <a:ext cx="2677886" cy="571502"/>
           </a:xfrm>
           <a:prstGeom prst="rect">
@@ -4124,7 +4075,7 @@
         </p:nvSpPr>
         <p:spPr>
           <a:xfrm>
-            <a:off x="-1167629" y="8189074"/>
+            <a:off x="310055" y="7723728"/>
             <a:ext cx="2677886" cy="571502"/>
           </a:xfrm>
           <a:prstGeom prst="rect">
@@ -4220,7 +4171,7 @@
         </p:nvSpPr>
         <p:spPr>
           <a:xfrm>
-            <a:off x="1466848" y="3422192"/>
+            <a:off x="2944532" y="2956846"/>
             <a:ext cx="2677886" cy="571502"/>
           </a:xfrm>
           <a:prstGeom prst="rect">
@@ -4316,7 +4267,7 @@
         </p:nvSpPr>
         <p:spPr>
           <a:xfrm>
-            <a:off x="4495798" y="3654877"/>
+            <a:off x="5928630" y="3026904"/>
             <a:ext cx="2677886" cy="571502"/>
           </a:xfrm>
           <a:prstGeom prst="rect">
@@ -4364,7 +4315,7 @@
         </p:nvSpPr>
         <p:spPr>
           <a:xfrm>
-            <a:off x="-1420634" y="4854344"/>
+            <a:off x="57050" y="4388998"/>
             <a:ext cx="2677886" cy="571502"/>
           </a:xfrm>
           <a:prstGeom prst="rect">
@@ -4412,7 +4363,7 @@
         </p:nvSpPr>
         <p:spPr>
           <a:xfrm>
-            <a:off x="7584720" y="1679115"/>
+            <a:off x="8939296" y="1293352"/>
             <a:ext cx="2677886" cy="571502"/>
           </a:xfrm>
           <a:prstGeom prst="rect">
@@ -4469,9 +4420,9 @@
           <p:nvPr/>
         </p:nvCxnSpPr>
         <p:spPr>
-          <a:xfrm rot="5400000" flipH="1" flipV="1">
-            <a:off x="5404752" y="-79262"/>
-            <a:ext cx="904192" cy="1"/>
+          <a:xfrm rot="16200000" flipV="1">
+            <a:off x="5723130" y="-158487"/>
+            <a:ext cx="750441" cy="4699"/>
           </a:xfrm>
           <a:prstGeom prst="bentConnector3">
             <a:avLst/>
@@ -4510,8 +4461,8 @@
         </p:nvCxnSpPr>
         <p:spPr>
           <a:xfrm rot="16200000" flipH="1">
-            <a:off x="6044459" y="2063007"/>
-            <a:ext cx="1178381" cy="1553603"/>
+            <a:off x="7424702" y="772865"/>
+            <a:ext cx="16322" cy="2664328"/>
           </a:xfrm>
           <a:prstGeom prst="bentConnector2">
             <a:avLst/>
@@ -4546,8 +4497,55 @@
         </p:nvSpPr>
         <p:spPr>
           <a:xfrm>
-            <a:off x="-1535248" y="6140887"/>
+            <a:off x="-48937" y="5502859"/>
             <a:ext cx="2985075" cy="571502"/>
+          </a:xfrm>
+          <a:prstGeom prst="rect">
+            <a:avLst/>
+          </a:prstGeom>
+        </p:spPr>
+        <p:style>
+          <a:lnRef idx="2">
+            <a:schemeClr val="dk1"/>
+          </a:lnRef>
+          <a:fillRef idx="1">
+            <a:schemeClr val="lt1"/>
+          </a:fillRef>
+          <a:effectRef idx="0">
+            <a:schemeClr val="dk1"/>
+          </a:effectRef>
+          <a:fontRef idx="minor">
+            <a:schemeClr val="dk1"/>
+          </a:fontRef>
+        </p:style>
+        <p:txBody>
+          <a:bodyPr rtlCol="0" anchor="ctr"/>
+          <a:lstStyle/>
+          <a:p>
+            <a:pPr algn="ctr"/>
+            <a:r>
+              <a:rPr lang="en-AU" dirty="0"/>
+              <a:t>Movie details Page</a:t>
+            </a:r>
+          </a:p>
+        </p:txBody>
+      </p:sp>
+      <p:sp>
+        <p:nvSpPr>
+          <p:cNvPr id="30" name="Rectangle 29">
+            <a:extLst>
+              <a:ext uri="{FF2B5EF4-FFF2-40B4-BE49-F238E27FC236}">
+                <a16:creationId xmlns:a16="http://schemas.microsoft.com/office/drawing/2014/main" id="{33B76563-5CA0-44B3-8AAB-1EA08B018352}"/>
+              </a:ext>
+            </a:extLst>
+          </p:cNvPr>
+          <p:cNvSpPr/>
+          <p:nvPr/>
+        </p:nvSpPr>
+        <p:spPr>
+          <a:xfrm>
+            <a:off x="3063850" y="5596569"/>
+            <a:ext cx="2864780" cy="571502"/>
           </a:xfrm>
           <a:prstGeom prst="rect">
             <a:avLst/>
@@ -4574,7 +4572,7 @@
             <a:pPr algn="ctr"/>
             <a:r>
               <a:rPr lang="en-AU" dirty="0"/>
-              <a:t>Movie details Page</a:t>
+              <a:t>Comment/rating page</a:t>
             </a:r>
           </a:p>
           <a:p>
@@ -4588,10 +4586,10 @@
       </p:sp>
       <p:sp>
         <p:nvSpPr>
-          <p:cNvPr id="30" name="Rectangle 29">
-            <a:extLst>
-              <a:ext uri="{FF2B5EF4-FFF2-40B4-BE49-F238E27FC236}">
-                <a16:creationId xmlns:a16="http://schemas.microsoft.com/office/drawing/2014/main" id="{33B76563-5CA0-44B3-8AAB-1EA08B018352}"/>
+          <p:cNvPr id="33" name="Rectangle 32">
+            <a:extLst>
+              <a:ext uri="{FF2B5EF4-FFF2-40B4-BE49-F238E27FC236}">
+                <a16:creationId xmlns:a16="http://schemas.microsoft.com/office/drawing/2014/main" id="{C5C3AAE4-C319-4DEA-BA95-9132110B8C16}"/>
               </a:ext>
             </a:extLst>
           </p:cNvPr>
@@ -4600,25 +4598,25 @@
         </p:nvSpPr>
         <p:spPr>
           <a:xfrm>
-            <a:off x="-1607528" y="7029432"/>
-            <a:ext cx="2864780" cy="571502"/>
+            <a:off x="726256" y="1818606"/>
+            <a:ext cx="2868404" cy="571502"/>
           </a:xfrm>
           <a:prstGeom prst="rect">
             <a:avLst/>
           </a:prstGeom>
         </p:spPr>
         <p:style>
-          <a:lnRef idx="0">
-            <a:schemeClr val="accent3"/>
+          <a:lnRef idx="2">
+            <a:schemeClr val="dk1"/>
           </a:lnRef>
-          <a:fillRef idx="3">
-            <a:schemeClr val="accent3"/>
+          <a:fillRef idx="1">
+            <a:schemeClr val="lt1"/>
           </a:fillRef>
-          <a:effectRef idx="3">
-            <a:schemeClr val="accent3"/>
+          <a:effectRef idx="0">
+            <a:schemeClr val="dk1"/>
           </a:effectRef>
           <a:fontRef idx="minor">
-            <a:schemeClr val="lt1"/>
+            <a:schemeClr val="dk1"/>
           </a:fontRef>
         </p:style>
         <p:txBody>
@@ -4627,25 +4625,19 @@
           <a:p>
             <a:pPr algn="ctr"/>
             <a:r>
-              <a:rPr lang="en-AU" dirty="0"/>
-              <a:t>Comment/rating page</a:t>
-            </a:r>
-          </a:p>
-          <a:p>
-            <a:pPr algn="ctr"/>
-            <a:r>
-              <a:rPr lang="en-AU" dirty="0"/>
-              <a:t>Need to be added</a:t>
-            </a:r>
-          </a:p>
-        </p:txBody>
-      </p:sp>
-      <p:sp>
-        <p:nvSpPr>
-          <p:cNvPr id="33" name="Rectangle 32">
-            <a:extLst>
-              <a:ext uri="{FF2B5EF4-FFF2-40B4-BE49-F238E27FC236}">
-                <a16:creationId xmlns:a16="http://schemas.microsoft.com/office/drawing/2014/main" id="{C5C3AAE4-C319-4DEA-BA95-9132110B8C16}"/>
+              <a:rPr lang="en-AU" dirty="0" err="1"/>
+              <a:t>Userprofile</a:t>
+            </a:r>
+            <a:endParaRPr lang="en-AU" dirty="0"/>
+          </a:p>
+        </p:txBody>
+      </p:sp>
+      <p:sp>
+        <p:nvSpPr>
+          <p:cNvPr id="34" name="Rectangle 33">
+            <a:extLst>
+              <a:ext uri="{FF2B5EF4-FFF2-40B4-BE49-F238E27FC236}">
+                <a16:creationId xmlns:a16="http://schemas.microsoft.com/office/drawing/2014/main" id="{1A3AC25B-6EB6-4B26-8943-3698BE2CEFEB}"/>
               </a:ext>
             </a:extLst>
           </p:cNvPr>
@@ -4654,63 +4646,8 @@
         </p:nvSpPr>
         <p:spPr>
           <a:xfrm>
-            <a:off x="-1286424" y="1804070"/>
-            <a:ext cx="4035376" cy="571502"/>
-          </a:xfrm>
-          <a:prstGeom prst="rect">
-            <a:avLst/>
-          </a:prstGeom>
-        </p:spPr>
-        <p:style>
-          <a:lnRef idx="0">
-            <a:schemeClr val="accent3"/>
-          </a:lnRef>
-          <a:fillRef idx="3">
-            <a:schemeClr val="accent3"/>
-          </a:fillRef>
-          <a:effectRef idx="3">
-            <a:schemeClr val="accent3"/>
-          </a:effectRef>
-          <a:fontRef idx="minor">
-            <a:schemeClr val="lt1"/>
-          </a:fontRef>
-        </p:style>
-        <p:txBody>
-          <a:bodyPr rtlCol="0" anchor="ctr"/>
-          <a:lstStyle/>
-          <a:p>
-            <a:pPr algn="ctr"/>
-            <a:r>
-              <a:rPr lang="en-AU" dirty="0" err="1"/>
-              <a:t>Userprofile</a:t>
-            </a:r>
-            <a:endParaRPr lang="en-AU" dirty="0"/>
-          </a:p>
-          <a:p>
-            <a:pPr algn="ctr"/>
-            <a:r>
-              <a:rPr lang="en-AU" dirty="0"/>
-              <a:t>Need to be added</a:t>
-            </a:r>
-          </a:p>
-        </p:txBody>
-      </p:sp>
-      <p:sp>
-        <p:nvSpPr>
-          <p:cNvPr id="34" name="Rectangle 33">
-            <a:extLst>
-              <a:ext uri="{FF2B5EF4-FFF2-40B4-BE49-F238E27FC236}">
-                <a16:creationId xmlns:a16="http://schemas.microsoft.com/office/drawing/2014/main" id="{1A3AC25B-6EB6-4B26-8943-3698BE2CEFEB}"/>
-              </a:ext>
-            </a:extLst>
-          </p:cNvPr>
-          <p:cNvSpPr/>
-          <p:nvPr/>
-        </p:nvSpPr>
-        <p:spPr>
-          <a:xfrm>
-            <a:off x="-1229585" y="296752"/>
-            <a:ext cx="4035376" cy="571502"/>
+            <a:off x="473184" y="296752"/>
+            <a:ext cx="2868404" cy="571502"/>
           </a:xfrm>
           <a:prstGeom prst="rect">
             <a:avLst/>

</xml_diff>

<commit_message>
accesslevelchange.php with validation, updated diagram
</commit_message>
<xml_diff>
--- a/extra/Sitemap.pptx
+++ b/extra/Sitemap.pptx
@@ -261,7 +261,7 @@
           <a:p>
             <a:fld id="{2326C657-C1E0-4964-BB1E-A691970DFC48}" type="datetimeFigureOut">
               <a:rPr lang="en-AU" smtClean="0"/>
-              <a:t>13/09/2018</a:t>
+              <a:t>19/09/2018</a:t>
             </a:fld>
             <a:endParaRPr lang="en-AU"/>
           </a:p>
@@ -461,7 +461,7 @@
           <a:p>
             <a:fld id="{2326C657-C1E0-4964-BB1E-A691970DFC48}" type="datetimeFigureOut">
               <a:rPr lang="en-AU" smtClean="0"/>
-              <a:t>13/09/2018</a:t>
+              <a:t>19/09/2018</a:t>
             </a:fld>
             <a:endParaRPr lang="en-AU"/>
           </a:p>
@@ -671,7 +671,7 @@
           <a:p>
             <a:fld id="{2326C657-C1E0-4964-BB1E-A691970DFC48}" type="datetimeFigureOut">
               <a:rPr lang="en-AU" smtClean="0"/>
-              <a:t>13/09/2018</a:t>
+              <a:t>19/09/2018</a:t>
             </a:fld>
             <a:endParaRPr lang="en-AU"/>
           </a:p>
@@ -871,7 +871,7 @@
           <a:p>
             <a:fld id="{2326C657-C1E0-4964-BB1E-A691970DFC48}" type="datetimeFigureOut">
               <a:rPr lang="en-AU" smtClean="0"/>
-              <a:t>13/09/2018</a:t>
+              <a:t>19/09/2018</a:t>
             </a:fld>
             <a:endParaRPr lang="en-AU"/>
           </a:p>
@@ -1147,7 +1147,7 @@
           <a:p>
             <a:fld id="{2326C657-C1E0-4964-BB1E-A691970DFC48}" type="datetimeFigureOut">
               <a:rPr lang="en-AU" smtClean="0"/>
-              <a:t>13/09/2018</a:t>
+              <a:t>19/09/2018</a:t>
             </a:fld>
             <a:endParaRPr lang="en-AU"/>
           </a:p>
@@ -1415,7 +1415,7 @@
           <a:p>
             <a:fld id="{2326C657-C1E0-4964-BB1E-A691970DFC48}" type="datetimeFigureOut">
               <a:rPr lang="en-AU" smtClean="0"/>
-              <a:t>13/09/2018</a:t>
+              <a:t>19/09/2018</a:t>
             </a:fld>
             <a:endParaRPr lang="en-AU"/>
           </a:p>
@@ -1830,7 +1830,7 @@
           <a:p>
             <a:fld id="{2326C657-C1E0-4964-BB1E-A691970DFC48}" type="datetimeFigureOut">
               <a:rPr lang="en-AU" smtClean="0"/>
-              <a:t>13/09/2018</a:t>
+              <a:t>19/09/2018</a:t>
             </a:fld>
             <a:endParaRPr lang="en-AU"/>
           </a:p>
@@ -1972,7 +1972,7 @@
           <a:p>
             <a:fld id="{2326C657-C1E0-4964-BB1E-A691970DFC48}" type="datetimeFigureOut">
               <a:rPr lang="en-AU" smtClean="0"/>
-              <a:t>13/09/2018</a:t>
+              <a:t>19/09/2018</a:t>
             </a:fld>
             <a:endParaRPr lang="en-AU"/>
           </a:p>
@@ -2085,7 +2085,7 @@
           <a:p>
             <a:fld id="{2326C657-C1E0-4964-BB1E-A691970DFC48}" type="datetimeFigureOut">
               <a:rPr lang="en-AU" smtClean="0"/>
-              <a:t>13/09/2018</a:t>
+              <a:t>19/09/2018</a:t>
             </a:fld>
             <a:endParaRPr lang="en-AU"/>
           </a:p>
@@ -2398,7 +2398,7 @@
           <a:p>
             <a:fld id="{2326C657-C1E0-4964-BB1E-A691970DFC48}" type="datetimeFigureOut">
               <a:rPr lang="en-AU" smtClean="0"/>
-              <a:t>13/09/2018</a:t>
+              <a:t>19/09/2018</a:t>
             </a:fld>
             <a:endParaRPr lang="en-AU"/>
           </a:p>
@@ -2687,7 +2687,7 @@
           <a:p>
             <a:fld id="{2326C657-C1E0-4964-BB1E-A691970DFC48}" type="datetimeFigureOut">
               <a:rPr lang="en-AU" smtClean="0"/>
-              <a:t>13/09/2018</a:t>
+              <a:t>19/09/2018</a:t>
             </a:fld>
             <a:endParaRPr lang="en-AU"/>
           </a:p>
@@ -2930,7 +2930,7 @@
           <a:p>
             <a:fld id="{2326C657-C1E0-4964-BB1E-A691970DFC48}" type="datetimeFigureOut">
               <a:rPr lang="en-AU" smtClean="0"/>
-              <a:t>13/09/2018</a:t>
+              <a:t>19/09/2018</a:t>
             </a:fld>
             <a:endParaRPr lang="en-AU"/>
           </a:p>
@@ -3563,8 +3563,8 @@
         </p:nvSpPr>
         <p:spPr>
           <a:xfrm>
-            <a:off x="0" y="-2409143"/>
-            <a:ext cx="12192000" cy="1877785"/>
+            <a:off x="-1" y="-2409143"/>
+            <a:ext cx="15167429" cy="1877785"/>
           </a:xfrm>
           <a:prstGeom prst="rect">
             <a:avLst/>
@@ -3662,8 +3662,8 @@
         </p:nvSpPr>
         <p:spPr>
           <a:xfrm>
-            <a:off x="8765027" y="0"/>
-            <a:ext cx="3426974" cy="4226379"/>
+            <a:off x="8765026" y="0"/>
+            <a:ext cx="6286287" cy="4226379"/>
           </a:xfrm>
           <a:prstGeom prst="rect">
             <a:avLst/>
@@ -3766,8 +3766,8 @@
         </p:nvSpPr>
         <p:spPr>
           <a:xfrm>
-            <a:off x="8903819" y="2927859"/>
-            <a:ext cx="2677886" cy="571502"/>
+            <a:off x="8145683" y="2341680"/>
+            <a:ext cx="3434710" cy="1070313"/>
           </a:xfrm>
           <a:prstGeom prst="rect">
             <a:avLst/>
@@ -3802,8 +3802,13 @@
             <a:pPr algn="ctr"/>
             <a:r>
               <a:rPr lang="en-AU" dirty="0"/>
-              <a:t>Admin Only</a:t>
-            </a:r>
+              <a:t>Admin can edit anyone, user can edit their own </a:t>
+            </a:r>
+            <a:r>
+              <a:rPr lang="en-AU" dirty="0" err="1"/>
+              <a:t>progile</a:t>
+            </a:r>
+            <a:endParaRPr lang="en-AU" dirty="0"/>
           </a:p>
         </p:txBody>
       </p:sp>
@@ -3924,8 +3929,8 @@
         </p:nvSpPr>
         <p:spPr>
           <a:xfrm>
-            <a:off x="8903819" y="2324098"/>
-            <a:ext cx="2677886" cy="571502"/>
+            <a:off x="8865719" y="1329418"/>
+            <a:ext cx="2677886" cy="632748"/>
           </a:xfrm>
           <a:prstGeom prst="rect">
             <a:avLst/>
@@ -4420,9 +4425,9 @@
           <p:nvPr/>
         </p:nvCxnSpPr>
         <p:spPr>
-          <a:xfrm rot="16200000" flipV="1">
-            <a:off x="5757730" y="-193087"/>
-            <a:ext cx="806477" cy="129935"/>
+          <a:xfrm rot="5400000" flipH="1" flipV="1">
+            <a:off x="6501586" y="-807008"/>
+            <a:ext cx="806477" cy="1357779"/>
           </a:xfrm>
           <a:prstGeom prst="bentConnector3">
             <a:avLst/>
@@ -4461,8 +4466,8 @@
         </p:nvCxnSpPr>
         <p:spPr>
           <a:xfrm rot="16200000" flipH="1">
-            <a:off x="7369890" y="718053"/>
-            <a:ext cx="105792" cy="2684481"/>
+            <a:off x="7369890" y="718054"/>
+            <a:ext cx="105792" cy="2684480"/>
           </a:xfrm>
           <a:prstGeom prst="bentConnector2">
             <a:avLst/>
@@ -4552,8 +4557,8 @@
         </p:nvSpPr>
         <p:spPr>
           <a:xfrm>
-            <a:off x="726256" y="1818606"/>
-            <a:ext cx="2868404" cy="571502"/>
+            <a:off x="1068996" y="1589427"/>
+            <a:ext cx="2868404" cy="1047523"/>
           </a:xfrm>
           <a:prstGeom prst="rect">
             <a:avLst/>
@@ -4581,6 +4586,18 @@
             <a:r>
               <a:rPr lang="en-AU" dirty="0" err="1"/>
               <a:t>Userprofile</a:t>
+            </a:r>
+            <a:endParaRPr lang="en-AU" dirty="0"/>
+          </a:p>
+          <a:p>
+            <a:pPr algn="ctr"/>
+            <a:r>
+              <a:rPr lang="en-AU" dirty="0"/>
+              <a:t>Only admin can change </a:t>
+            </a:r>
+            <a:r>
+              <a:rPr lang="en-AU" dirty="0" err="1"/>
+              <a:t>accesslevel</a:t>
             </a:r>
             <a:endParaRPr lang="en-AU" dirty="0"/>
           </a:p>
@@ -4952,12 +4969,12 @@
         </p:nvCxnSpPr>
         <p:spPr>
           <a:xfrm>
-            <a:off x="11581705" y="2609849"/>
-            <a:ext cx="35477" cy="2165069"/>
+            <a:off x="11543605" y="1645792"/>
+            <a:ext cx="73577" cy="3129126"/>
           </a:xfrm>
           <a:prstGeom prst="bentConnector3">
             <a:avLst>
-              <a:gd name="adj1" fmla="val 744361"/>
+              <a:gd name="adj1" fmla="val 410695"/>
             </a:avLst>
           </a:prstGeom>
         </p:spPr>
@@ -5036,6 +5053,244 @@
             <a:ext cx="362210" cy="3123568"/>
           </a:xfrm>
           <a:prstGeom prst="bentConnector2">
+            <a:avLst/>
+          </a:prstGeom>
+        </p:spPr>
+        <p:style>
+          <a:lnRef idx="1">
+            <a:schemeClr val="accent1"/>
+          </a:lnRef>
+          <a:fillRef idx="0">
+            <a:schemeClr val="accent1"/>
+          </a:fillRef>
+          <a:effectRef idx="0">
+            <a:schemeClr val="accent1"/>
+          </a:effectRef>
+          <a:fontRef idx="minor">
+            <a:schemeClr val="tx1"/>
+          </a:fontRef>
+        </p:style>
+      </p:cxnSp>
+      <p:sp>
+        <p:nvSpPr>
+          <p:cNvPr id="38" name="Rectangle 37">
+            <a:extLst>
+              <a:ext uri="{FF2B5EF4-FFF2-40B4-BE49-F238E27FC236}">
+                <a16:creationId xmlns:a16="http://schemas.microsoft.com/office/drawing/2014/main" id="{D1E550BB-3A32-4CB7-92F1-203E5F03E2ED}"/>
+              </a:ext>
+            </a:extLst>
+          </p:cNvPr>
+          <p:cNvSpPr/>
+          <p:nvPr/>
+        </p:nvSpPr>
+        <p:spPr>
+          <a:xfrm>
+            <a:off x="4560498" y="-2140257"/>
+            <a:ext cx="2677886" cy="571502"/>
+          </a:xfrm>
+          <a:prstGeom prst="rect">
+            <a:avLst/>
+          </a:prstGeom>
+        </p:spPr>
+        <p:style>
+          <a:lnRef idx="2">
+            <a:schemeClr val="dk1"/>
+          </a:lnRef>
+          <a:fillRef idx="1">
+            <a:schemeClr val="lt1"/>
+          </a:fillRef>
+          <a:effectRef idx="0">
+            <a:schemeClr val="dk1"/>
+          </a:effectRef>
+          <a:fontRef idx="minor">
+            <a:schemeClr val="dk1"/>
+          </a:fontRef>
+        </p:style>
+        <p:txBody>
+          <a:bodyPr rtlCol="0" anchor="ctr"/>
+          <a:lstStyle/>
+          <a:p>
+            <a:pPr algn="ctr"/>
+            <a:r>
+              <a:rPr lang="en-AU" dirty="0"/>
+              <a:t>Validation.js</a:t>
+            </a:r>
+          </a:p>
+        </p:txBody>
+      </p:sp>
+      <p:sp>
+        <p:nvSpPr>
+          <p:cNvPr id="42" name="Rectangle 41">
+            <a:extLst>
+              <a:ext uri="{FF2B5EF4-FFF2-40B4-BE49-F238E27FC236}">
+                <a16:creationId xmlns:a16="http://schemas.microsoft.com/office/drawing/2014/main" id="{174374D7-619A-48E3-8A77-FDC3871AEC4C}"/>
+              </a:ext>
+            </a:extLst>
+          </p:cNvPr>
+          <p:cNvSpPr/>
+          <p:nvPr/>
+        </p:nvSpPr>
+        <p:spPr>
+          <a:xfrm>
+            <a:off x="12466326" y="452268"/>
+            <a:ext cx="2432432" cy="571502"/>
+          </a:xfrm>
+          <a:prstGeom prst="rect">
+            <a:avLst/>
+          </a:prstGeom>
+        </p:spPr>
+        <p:style>
+          <a:lnRef idx="2">
+            <a:schemeClr val="dk1"/>
+          </a:lnRef>
+          <a:fillRef idx="1">
+            <a:schemeClr val="lt1"/>
+          </a:fillRef>
+          <a:effectRef idx="0">
+            <a:schemeClr val="dk1"/>
+          </a:effectRef>
+          <a:fontRef idx="minor">
+            <a:schemeClr val="dk1"/>
+          </a:fontRef>
+        </p:style>
+        <p:txBody>
+          <a:bodyPr rtlCol="0" anchor="ctr"/>
+          <a:lstStyle/>
+          <a:p>
+            <a:pPr algn="ctr"/>
+            <a:r>
+              <a:rPr lang="en-AU" dirty="0" err="1"/>
+              <a:t>accesslevelchange.php</a:t>
+            </a:r>
+            <a:endParaRPr lang="en-AU" dirty="0"/>
+          </a:p>
+          <a:p>
+            <a:pPr algn="ctr"/>
+            <a:r>
+              <a:rPr lang="en-AU" dirty="0"/>
+              <a:t>Admin only</a:t>
+            </a:r>
+          </a:p>
+        </p:txBody>
+      </p:sp>
+      <p:sp>
+        <p:nvSpPr>
+          <p:cNvPr id="44" name="Rectangle 43">
+            <a:extLst>
+              <a:ext uri="{FF2B5EF4-FFF2-40B4-BE49-F238E27FC236}">
+                <a16:creationId xmlns:a16="http://schemas.microsoft.com/office/drawing/2014/main" id="{BCBF4FB5-A1A0-4294-884D-07656BB47627}"/>
+              </a:ext>
+            </a:extLst>
+          </p:cNvPr>
+          <p:cNvSpPr/>
+          <p:nvPr/>
+        </p:nvSpPr>
+        <p:spPr>
+          <a:xfrm>
+            <a:off x="11711582" y="-1440968"/>
+            <a:ext cx="3187176" cy="571502"/>
+          </a:xfrm>
+          <a:prstGeom prst="rect">
+            <a:avLst/>
+          </a:prstGeom>
+        </p:spPr>
+        <p:style>
+          <a:lnRef idx="2">
+            <a:schemeClr val="dk1"/>
+          </a:lnRef>
+          <a:fillRef idx="1">
+            <a:schemeClr val="lt1"/>
+          </a:fillRef>
+          <a:effectRef idx="0">
+            <a:schemeClr val="dk1"/>
+          </a:effectRef>
+          <a:fontRef idx="minor">
+            <a:schemeClr val="dk1"/>
+          </a:fontRef>
+        </p:style>
+        <p:txBody>
+          <a:bodyPr rtlCol="0" anchor="ctr"/>
+          <a:lstStyle/>
+          <a:p>
+            <a:pPr algn="ctr"/>
+            <a:r>
+              <a:rPr lang="en-AU" dirty="0" err="1"/>
+              <a:t>accesslevelchangeresult.php</a:t>
+            </a:r>
+            <a:endParaRPr lang="en-AU" dirty="0"/>
+          </a:p>
+          <a:p>
+            <a:pPr algn="ctr"/>
+            <a:r>
+              <a:rPr lang="en-AU" dirty="0"/>
+              <a:t>Admin only</a:t>
+            </a:r>
+          </a:p>
+        </p:txBody>
+      </p:sp>
+      <p:cxnSp>
+        <p:nvCxnSpPr>
+          <p:cNvPr id="34" name="Connector: Elbow 33">
+            <a:extLst>
+              <a:ext uri="{FF2B5EF4-FFF2-40B4-BE49-F238E27FC236}">
+                <a16:creationId xmlns:a16="http://schemas.microsoft.com/office/drawing/2014/main" id="{71EB402B-C507-4199-90EA-0CFB3088C272}"/>
+              </a:ext>
+            </a:extLst>
+          </p:cNvPr>
+          <p:cNvCxnSpPr>
+            <a:cxnSpLocks/>
+            <a:stCxn id="42" idx="0"/>
+            <a:endCxn id="44" idx="2"/>
+          </p:cNvCxnSpPr>
+          <p:nvPr/>
+        </p:nvCxnSpPr>
+        <p:spPr>
+          <a:xfrm rot="16200000" flipV="1">
+            <a:off x="12832989" y="-397285"/>
+            <a:ext cx="1321734" cy="377372"/>
+          </a:xfrm>
+          <a:prstGeom prst="bentConnector3">
+            <a:avLst>
+              <a:gd name="adj1" fmla="val 50000"/>
+            </a:avLst>
+          </a:prstGeom>
+        </p:spPr>
+        <p:style>
+          <a:lnRef idx="1">
+            <a:schemeClr val="accent1"/>
+          </a:lnRef>
+          <a:fillRef idx="0">
+            <a:schemeClr val="accent1"/>
+          </a:fillRef>
+          <a:effectRef idx="0">
+            <a:schemeClr val="accent1"/>
+          </a:effectRef>
+          <a:fontRef idx="minor">
+            <a:schemeClr val="tx1"/>
+          </a:fontRef>
+        </p:style>
+      </p:cxnSp>
+      <p:cxnSp>
+        <p:nvCxnSpPr>
+          <p:cNvPr id="51" name="Connector: Elbow 50">
+            <a:extLst>
+              <a:ext uri="{FF2B5EF4-FFF2-40B4-BE49-F238E27FC236}">
+                <a16:creationId xmlns:a16="http://schemas.microsoft.com/office/drawing/2014/main" id="{8535D71F-07DF-4912-AF3D-16D92044D578}"/>
+              </a:ext>
+            </a:extLst>
+          </p:cNvPr>
+          <p:cNvCxnSpPr>
+            <a:stCxn id="42" idx="1"/>
+            <a:endCxn id="33" idx="3"/>
+          </p:cNvCxnSpPr>
+          <p:nvPr/>
+        </p:nvCxnSpPr>
+        <p:spPr>
+          <a:xfrm rot="10800000" flipV="1">
+            <a:off x="3937400" y="738019"/>
+            <a:ext cx="8528926" cy="1375170"/>
+          </a:xfrm>
+          <a:prstGeom prst="bentConnector3">
             <a:avLst/>
           </a:prstGeom>
         </p:spPr>

</xml_diff>

<commit_message>
Ban controll for moderator
</commit_message>
<xml_diff>
--- a/extra/Sitemap.pptx
+++ b/extra/Sitemap.pptx
@@ -5291,6 +5291,365 @@
             <a:ext cx="8528926" cy="1375170"/>
           </a:xfrm>
           <a:prstGeom prst="bentConnector3">
+            <a:avLst/>
+          </a:prstGeom>
+        </p:spPr>
+        <p:style>
+          <a:lnRef idx="1">
+            <a:schemeClr val="accent1"/>
+          </a:lnRef>
+          <a:fillRef idx="0">
+            <a:schemeClr val="accent1"/>
+          </a:fillRef>
+          <a:effectRef idx="0">
+            <a:schemeClr val="accent1"/>
+          </a:effectRef>
+          <a:fontRef idx="minor">
+            <a:schemeClr val="tx1"/>
+          </a:fontRef>
+        </p:style>
+      </p:cxnSp>
+      <p:sp>
+        <p:nvSpPr>
+          <p:cNvPr id="45" name="Rectangle 44">
+            <a:extLst>
+              <a:ext uri="{FF2B5EF4-FFF2-40B4-BE49-F238E27FC236}">
+                <a16:creationId xmlns:a16="http://schemas.microsoft.com/office/drawing/2014/main" id="{0037AEDB-0765-4770-8B56-E3C7C0054B87}"/>
+              </a:ext>
+            </a:extLst>
+          </p:cNvPr>
+          <p:cNvSpPr/>
+          <p:nvPr/>
+        </p:nvSpPr>
+        <p:spPr>
+          <a:xfrm>
+            <a:off x="6858167" y="7322849"/>
+            <a:ext cx="6286287" cy="4226379"/>
+          </a:xfrm>
+          <a:prstGeom prst="rect">
+            <a:avLst/>
+          </a:prstGeom>
+        </p:spPr>
+        <p:style>
+          <a:lnRef idx="2">
+            <a:schemeClr val="accent4">
+              <a:shade val="50000"/>
+            </a:schemeClr>
+          </a:lnRef>
+          <a:fillRef idx="1">
+            <a:schemeClr val="accent4"/>
+          </a:fillRef>
+          <a:effectRef idx="0">
+            <a:schemeClr val="accent4"/>
+          </a:effectRef>
+          <a:fontRef idx="minor">
+            <a:schemeClr val="lt1"/>
+          </a:fontRef>
+        </p:style>
+        <p:txBody>
+          <a:bodyPr rtlCol="0" anchor="ctr"/>
+          <a:lstStyle/>
+          <a:p>
+            <a:pPr algn="ctr"/>
+            <a:r>
+              <a:rPr lang="en-AU" dirty="0"/>
+              <a:t>Moderator area</a:t>
+            </a:r>
+          </a:p>
+        </p:txBody>
+      </p:sp>
+      <p:sp>
+        <p:nvSpPr>
+          <p:cNvPr id="49" name="Rectangle 48">
+            <a:extLst>
+              <a:ext uri="{FF2B5EF4-FFF2-40B4-BE49-F238E27FC236}">
+                <a16:creationId xmlns:a16="http://schemas.microsoft.com/office/drawing/2014/main" id="{F3778118-90B1-47C6-838F-97DAA5703D5F}"/>
+              </a:ext>
+            </a:extLst>
+          </p:cNvPr>
+          <p:cNvSpPr/>
+          <p:nvPr/>
+        </p:nvSpPr>
+        <p:spPr>
+          <a:xfrm>
+            <a:off x="7321931" y="9959760"/>
+            <a:ext cx="5702870" cy="2221771"/>
+          </a:xfrm>
+          <a:prstGeom prst="rect">
+            <a:avLst/>
+          </a:prstGeom>
+        </p:spPr>
+        <p:style>
+          <a:lnRef idx="2">
+            <a:schemeClr val="accent6">
+              <a:shade val="50000"/>
+            </a:schemeClr>
+          </a:lnRef>
+          <a:fillRef idx="1">
+            <a:schemeClr val="accent6"/>
+          </a:fillRef>
+          <a:effectRef idx="0">
+            <a:schemeClr val="accent6"/>
+          </a:effectRef>
+          <a:fontRef idx="minor">
+            <a:schemeClr val="lt1"/>
+          </a:fontRef>
+        </p:style>
+        <p:txBody>
+          <a:bodyPr rtlCol="0" anchor="ctr"/>
+          <a:lstStyle/>
+          <a:p>
+            <a:pPr algn="ctr"/>
+            <a:r>
+              <a:rPr lang="en-AU" dirty="0"/>
+              <a:t>Functions</a:t>
+            </a:r>
+          </a:p>
+        </p:txBody>
+      </p:sp>
+      <p:sp>
+        <p:nvSpPr>
+          <p:cNvPr id="50" name="Rectangle 49">
+            <a:extLst>
+              <a:ext uri="{FF2B5EF4-FFF2-40B4-BE49-F238E27FC236}">
+                <a16:creationId xmlns:a16="http://schemas.microsoft.com/office/drawing/2014/main" id="{9E912DB8-8B8B-4D98-8751-0848F4A12A5B}"/>
+              </a:ext>
+            </a:extLst>
+          </p:cNvPr>
+          <p:cNvSpPr/>
+          <p:nvPr/>
+        </p:nvSpPr>
+        <p:spPr>
+          <a:xfrm>
+            <a:off x="7600353" y="10270328"/>
+            <a:ext cx="2677886" cy="571502"/>
+          </a:xfrm>
+          <a:prstGeom prst="rect">
+            <a:avLst/>
+          </a:prstGeom>
+        </p:spPr>
+        <p:style>
+          <a:lnRef idx="2">
+            <a:schemeClr val="dk1"/>
+          </a:lnRef>
+          <a:fillRef idx="1">
+            <a:schemeClr val="lt1"/>
+          </a:fillRef>
+          <a:effectRef idx="0">
+            <a:schemeClr val="dk1"/>
+          </a:effectRef>
+          <a:fontRef idx="minor">
+            <a:schemeClr val="dk1"/>
+          </a:fontRef>
+        </p:style>
+        <p:txBody>
+          <a:bodyPr rtlCol="0" anchor="ctr"/>
+          <a:lstStyle/>
+          <a:p>
+            <a:pPr algn="ctr"/>
+            <a:r>
+              <a:rPr lang="en-AU" dirty="0" err="1"/>
+              <a:t>deletediscussion.php</a:t>
+            </a:r>
+            <a:endParaRPr lang="en-AU" dirty="0"/>
+          </a:p>
+        </p:txBody>
+      </p:sp>
+      <p:cxnSp>
+        <p:nvCxnSpPr>
+          <p:cNvPr id="11" name="Connector: Elbow 10">
+            <a:extLst>
+              <a:ext uri="{FF2B5EF4-FFF2-40B4-BE49-F238E27FC236}">
+                <a16:creationId xmlns:a16="http://schemas.microsoft.com/office/drawing/2014/main" id="{A3C30306-8B7C-4479-A997-38C24EE0265A}"/>
+              </a:ext>
+            </a:extLst>
+          </p:cNvPr>
+          <p:cNvCxnSpPr>
+            <a:stCxn id="28" idx="3"/>
+            <a:endCxn id="50" idx="0"/>
+          </p:cNvCxnSpPr>
+          <p:nvPr/>
+        </p:nvCxnSpPr>
+        <p:spPr>
+          <a:xfrm>
+            <a:off x="2936138" y="6125007"/>
+            <a:ext cx="6003158" cy="4145321"/>
+          </a:xfrm>
+          <a:prstGeom prst="bentConnector2">
+            <a:avLst/>
+          </a:prstGeom>
+        </p:spPr>
+        <p:style>
+          <a:lnRef idx="1">
+            <a:schemeClr val="accent1"/>
+          </a:lnRef>
+          <a:fillRef idx="0">
+            <a:schemeClr val="accent1"/>
+          </a:fillRef>
+          <a:effectRef idx="0">
+            <a:schemeClr val="accent1"/>
+          </a:effectRef>
+          <a:fontRef idx="minor">
+            <a:schemeClr val="tx1"/>
+          </a:fontRef>
+        </p:style>
+      </p:cxnSp>
+      <p:sp>
+        <p:nvSpPr>
+          <p:cNvPr id="52" name="Rectangle 51">
+            <a:extLst>
+              <a:ext uri="{FF2B5EF4-FFF2-40B4-BE49-F238E27FC236}">
+                <a16:creationId xmlns:a16="http://schemas.microsoft.com/office/drawing/2014/main" id="{4EFDCA0D-60E1-4408-96B1-ADBF3AEBD777}"/>
+              </a:ext>
+            </a:extLst>
+          </p:cNvPr>
+          <p:cNvSpPr/>
+          <p:nvPr/>
+        </p:nvSpPr>
+        <p:spPr>
+          <a:xfrm>
+            <a:off x="7321931" y="11468170"/>
+            <a:ext cx="2677886" cy="571502"/>
+          </a:xfrm>
+          <a:prstGeom prst="rect">
+            <a:avLst/>
+          </a:prstGeom>
+        </p:spPr>
+        <p:style>
+          <a:lnRef idx="2">
+            <a:schemeClr val="dk1"/>
+          </a:lnRef>
+          <a:fillRef idx="1">
+            <a:schemeClr val="lt1"/>
+          </a:fillRef>
+          <a:effectRef idx="0">
+            <a:schemeClr val="dk1"/>
+          </a:effectRef>
+          <a:fontRef idx="minor">
+            <a:schemeClr val="dk1"/>
+          </a:fontRef>
+        </p:style>
+        <p:txBody>
+          <a:bodyPr rtlCol="0" anchor="ctr"/>
+          <a:lstStyle/>
+          <a:p>
+            <a:pPr algn="ctr"/>
+            <a:r>
+              <a:rPr lang="en-AU" dirty="0" err="1"/>
+              <a:t>banuser.php</a:t>
+            </a:r>
+            <a:endParaRPr lang="en-AU" dirty="0"/>
+          </a:p>
+        </p:txBody>
+      </p:sp>
+      <p:sp>
+        <p:nvSpPr>
+          <p:cNvPr id="53" name="Rectangle 52">
+            <a:extLst>
+              <a:ext uri="{FF2B5EF4-FFF2-40B4-BE49-F238E27FC236}">
+                <a16:creationId xmlns:a16="http://schemas.microsoft.com/office/drawing/2014/main" id="{F61DE8C7-31BD-4FB7-8802-A79AD646C023}"/>
+              </a:ext>
+            </a:extLst>
+          </p:cNvPr>
+          <p:cNvSpPr/>
+          <p:nvPr/>
+        </p:nvSpPr>
+        <p:spPr>
+          <a:xfrm>
+            <a:off x="10176601" y="11495902"/>
+            <a:ext cx="2677886" cy="571502"/>
+          </a:xfrm>
+          <a:prstGeom prst="rect">
+            <a:avLst/>
+          </a:prstGeom>
+        </p:spPr>
+        <p:style>
+          <a:lnRef idx="2">
+            <a:schemeClr val="dk1"/>
+          </a:lnRef>
+          <a:fillRef idx="1">
+            <a:schemeClr val="lt1"/>
+          </a:fillRef>
+          <a:effectRef idx="0">
+            <a:schemeClr val="dk1"/>
+          </a:effectRef>
+          <a:fontRef idx="minor">
+            <a:schemeClr val="dk1"/>
+          </a:fontRef>
+        </p:style>
+        <p:txBody>
+          <a:bodyPr rtlCol="0" anchor="ctr"/>
+          <a:lstStyle/>
+          <a:p>
+            <a:pPr algn="ctr"/>
+            <a:r>
+              <a:rPr lang="en-AU" dirty="0" err="1"/>
+              <a:t>banuserresult.php</a:t>
+            </a:r>
+            <a:endParaRPr lang="en-AU" dirty="0"/>
+          </a:p>
+        </p:txBody>
+      </p:sp>
+      <p:cxnSp>
+        <p:nvCxnSpPr>
+          <p:cNvPr id="19" name="Connector: Elbow 18">
+            <a:extLst>
+              <a:ext uri="{FF2B5EF4-FFF2-40B4-BE49-F238E27FC236}">
+                <a16:creationId xmlns:a16="http://schemas.microsoft.com/office/drawing/2014/main" id="{31A680EC-24C9-445F-B918-88CA2C73CAB7}"/>
+              </a:ext>
+            </a:extLst>
+          </p:cNvPr>
+          <p:cNvCxnSpPr>
+            <a:stCxn id="52" idx="3"/>
+            <a:endCxn id="53" idx="1"/>
+          </p:cNvCxnSpPr>
+          <p:nvPr/>
+        </p:nvCxnSpPr>
+        <p:spPr>
+          <a:xfrm>
+            <a:off x="9999817" y="11753921"/>
+            <a:ext cx="176784" cy="27732"/>
+          </a:xfrm>
+          <a:prstGeom prst="bentConnector3">
+            <a:avLst/>
+          </a:prstGeom>
+        </p:spPr>
+        <p:style>
+          <a:lnRef idx="1">
+            <a:schemeClr val="accent1"/>
+          </a:lnRef>
+          <a:fillRef idx="0">
+            <a:schemeClr val="accent1"/>
+          </a:fillRef>
+          <a:effectRef idx="0">
+            <a:schemeClr val="accent1"/>
+          </a:effectRef>
+          <a:fontRef idx="minor">
+            <a:schemeClr val="tx1"/>
+          </a:fontRef>
+        </p:style>
+      </p:cxnSp>
+      <p:cxnSp>
+        <p:nvCxnSpPr>
+          <p:cNvPr id="39" name="Connector: Elbow 38">
+            <a:extLst>
+              <a:ext uri="{FF2B5EF4-FFF2-40B4-BE49-F238E27FC236}">
+                <a16:creationId xmlns:a16="http://schemas.microsoft.com/office/drawing/2014/main" id="{8E293A9C-EE62-41EE-99D8-C08434200506}"/>
+              </a:ext>
+            </a:extLst>
+          </p:cNvPr>
+          <p:cNvCxnSpPr>
+            <a:stCxn id="33" idx="2"/>
+            <a:endCxn id="52" idx="1"/>
+          </p:cNvCxnSpPr>
+          <p:nvPr/>
+        </p:nvCxnSpPr>
+        <p:spPr>
+          <a:xfrm rot="16200000" flipH="1">
+            <a:off x="354079" y="4786068"/>
+            <a:ext cx="9116971" cy="4818733"/>
+          </a:xfrm>
+          <a:prstGeom prst="bentConnector2">
             <a:avLst/>
           </a:prstGeom>
         </p:spPr>

</xml_diff>

<commit_message>
Site Statistics.php Created and fully working
</commit_message>
<xml_diff>
--- a/extra/Sitemap.pptx
+++ b/extra/Sitemap.pptx
@@ -261,7 +261,7 @@
           <a:p>
             <a:fld id="{2326C657-C1E0-4964-BB1E-A691970DFC48}" type="datetimeFigureOut">
               <a:rPr lang="en-AU" smtClean="0"/>
-              <a:t>26/09/2018</a:t>
+              <a:t>3/10/2018</a:t>
             </a:fld>
             <a:endParaRPr lang="en-AU"/>
           </a:p>
@@ -461,7 +461,7 @@
           <a:p>
             <a:fld id="{2326C657-C1E0-4964-BB1E-A691970DFC48}" type="datetimeFigureOut">
               <a:rPr lang="en-AU" smtClean="0"/>
-              <a:t>26/09/2018</a:t>
+              <a:t>3/10/2018</a:t>
             </a:fld>
             <a:endParaRPr lang="en-AU"/>
           </a:p>
@@ -671,7 +671,7 @@
           <a:p>
             <a:fld id="{2326C657-C1E0-4964-BB1E-A691970DFC48}" type="datetimeFigureOut">
               <a:rPr lang="en-AU" smtClean="0"/>
-              <a:t>26/09/2018</a:t>
+              <a:t>3/10/2018</a:t>
             </a:fld>
             <a:endParaRPr lang="en-AU"/>
           </a:p>
@@ -871,7 +871,7 @@
           <a:p>
             <a:fld id="{2326C657-C1E0-4964-BB1E-A691970DFC48}" type="datetimeFigureOut">
               <a:rPr lang="en-AU" smtClean="0"/>
-              <a:t>26/09/2018</a:t>
+              <a:t>3/10/2018</a:t>
             </a:fld>
             <a:endParaRPr lang="en-AU"/>
           </a:p>
@@ -1147,7 +1147,7 @@
           <a:p>
             <a:fld id="{2326C657-C1E0-4964-BB1E-A691970DFC48}" type="datetimeFigureOut">
               <a:rPr lang="en-AU" smtClean="0"/>
-              <a:t>26/09/2018</a:t>
+              <a:t>3/10/2018</a:t>
             </a:fld>
             <a:endParaRPr lang="en-AU"/>
           </a:p>
@@ -1415,7 +1415,7 @@
           <a:p>
             <a:fld id="{2326C657-C1E0-4964-BB1E-A691970DFC48}" type="datetimeFigureOut">
               <a:rPr lang="en-AU" smtClean="0"/>
-              <a:t>26/09/2018</a:t>
+              <a:t>3/10/2018</a:t>
             </a:fld>
             <a:endParaRPr lang="en-AU"/>
           </a:p>
@@ -1830,7 +1830,7 @@
           <a:p>
             <a:fld id="{2326C657-C1E0-4964-BB1E-A691970DFC48}" type="datetimeFigureOut">
               <a:rPr lang="en-AU" smtClean="0"/>
-              <a:t>26/09/2018</a:t>
+              <a:t>3/10/2018</a:t>
             </a:fld>
             <a:endParaRPr lang="en-AU"/>
           </a:p>
@@ -1972,7 +1972,7 @@
           <a:p>
             <a:fld id="{2326C657-C1E0-4964-BB1E-A691970DFC48}" type="datetimeFigureOut">
               <a:rPr lang="en-AU" smtClean="0"/>
-              <a:t>26/09/2018</a:t>
+              <a:t>3/10/2018</a:t>
             </a:fld>
             <a:endParaRPr lang="en-AU"/>
           </a:p>
@@ -2085,7 +2085,7 @@
           <a:p>
             <a:fld id="{2326C657-C1E0-4964-BB1E-A691970DFC48}" type="datetimeFigureOut">
               <a:rPr lang="en-AU" smtClean="0"/>
-              <a:t>26/09/2018</a:t>
+              <a:t>3/10/2018</a:t>
             </a:fld>
             <a:endParaRPr lang="en-AU"/>
           </a:p>
@@ -2398,7 +2398,7 @@
           <a:p>
             <a:fld id="{2326C657-C1E0-4964-BB1E-A691970DFC48}" type="datetimeFigureOut">
               <a:rPr lang="en-AU" smtClean="0"/>
-              <a:t>26/09/2018</a:t>
+              <a:t>3/10/2018</a:t>
             </a:fld>
             <a:endParaRPr lang="en-AU"/>
           </a:p>
@@ -2687,7 +2687,7 @@
           <a:p>
             <a:fld id="{2326C657-C1E0-4964-BB1E-A691970DFC48}" type="datetimeFigureOut">
               <a:rPr lang="en-AU" smtClean="0"/>
-              <a:t>26/09/2018</a:t>
+              <a:t>3/10/2018</a:t>
             </a:fld>
             <a:endParaRPr lang="en-AU"/>
           </a:p>
@@ -2930,7 +2930,7 @@
           <a:p>
             <a:fld id="{2326C657-C1E0-4964-BB1E-A691970DFC48}" type="datetimeFigureOut">
               <a:rPr lang="en-AU" smtClean="0"/>
-              <a:t>26/09/2018</a:t>
+              <a:t>3/10/2018</a:t>
             </a:fld>
             <a:endParaRPr lang="en-AU"/>
           </a:p>
@@ -5668,6 +5668,54 @@
           </a:fontRef>
         </p:style>
       </p:cxnSp>
+      <p:sp>
+        <p:nvSpPr>
+          <p:cNvPr id="55" name="Rectangle 54">
+            <a:extLst>
+              <a:ext uri="{FF2B5EF4-FFF2-40B4-BE49-F238E27FC236}">
+                <a16:creationId xmlns:a16="http://schemas.microsoft.com/office/drawing/2014/main" id="{36C18049-7A6E-482F-A23E-9421CDE0FE19}"/>
+              </a:ext>
+            </a:extLst>
+          </p:cNvPr>
+          <p:cNvSpPr/>
+          <p:nvPr/>
+        </p:nvSpPr>
+        <p:spPr>
+          <a:xfrm>
+            <a:off x="12220872" y="3247684"/>
+            <a:ext cx="2677886" cy="571502"/>
+          </a:xfrm>
+          <a:prstGeom prst="rect">
+            <a:avLst/>
+          </a:prstGeom>
+        </p:spPr>
+        <p:style>
+          <a:lnRef idx="2">
+            <a:schemeClr val="dk1"/>
+          </a:lnRef>
+          <a:fillRef idx="1">
+            <a:schemeClr val="lt1"/>
+          </a:fillRef>
+          <a:effectRef idx="0">
+            <a:schemeClr val="dk1"/>
+          </a:effectRef>
+          <a:fontRef idx="minor">
+            <a:schemeClr val="dk1"/>
+          </a:fontRef>
+        </p:style>
+        <p:txBody>
+          <a:bodyPr rtlCol="0" anchor="ctr"/>
+          <a:lstStyle/>
+          <a:p>
+            <a:pPr algn="ctr"/>
+            <a:r>
+              <a:rPr lang="en-AU" dirty="0" err="1"/>
+              <a:t>Statistics.php</a:t>
+            </a:r>
+            <a:endParaRPr lang="en-AU" dirty="0"/>
+          </a:p>
+        </p:txBody>
+      </p:sp>
     </p:spTree>
     <p:extLst>
       <p:ext uri="{BB962C8B-B14F-4D97-AF65-F5344CB8AC3E}">

</xml_diff>